<commit_message>
Fragen bis VC109 hinzugefügt, damit ist Seite 14 des Fragenkatalogs abgearbeitet
</commit_message>
<xml_diff>
--- a/Kenntnisse_von_Vorschriften/Lichtblicke_Kenntnisse_von_Vorschriften.pptx
+++ b/Kenntnisse_von_Vorschriften/Lichtblicke_Kenntnisse_von_Vorschriften.pptx
@@ -46,6 +46,8 @@
     <p:sldId id="303" r:id="rId40"/>
     <p:sldId id="304" r:id="rId41"/>
     <p:sldId id="305" r:id="rId42"/>
+    <p:sldId id="306" r:id="rId43"/>
+    <p:sldId id="307" r:id="rId44"/>
   </p:sldIdLst>
   <p:sldSz cx="12192000" cy="6858000"/>
   <p:notesSz cx="6858000" cy="9144000"/>
@@ -202,6 +204,8 @@
             <p14:sldId id="303"/>
             <p14:sldId id="304"/>
             <p14:sldId id="305"/>
+            <p14:sldId id="306"/>
+            <p14:sldId id="307"/>
           </p14:sldIdLst>
         </p14:section>
       </p14:sectionLst>
@@ -216,7 +220,7 @@
 <file path=ppt/revisionInfo.xml><?xml version="1.0" encoding="utf-8"?>
 <p1510:revInfo xmlns:a="http://schemas.openxmlformats.org/drawingml/2006/main" xmlns:r="http://schemas.openxmlformats.org/officeDocument/2006/relationships" xmlns:p1510="http://schemas.microsoft.com/office/powerpoint/2015/10/main">
   <p1510:revLst>
-    <p1510:client id="{6C59C6E9-0E6E-420A-A1AB-10109172E705}" v="261" dt="2025-08-10T16:52:47.532"/>
+    <p1510:client id="{6C59C6E9-0E6E-420A-A1AB-10109172E705}" v="276" dt="2025-08-10T17:24:59.860"/>
   </p1510:revLst>
 </p1510:revInfo>
 </file>
@@ -226,7 +230,7 @@
   <pc:docChgLst>
     <pc:chgData name="Konrad Ritter" userId="a6e8e9d6da2f7611" providerId="LiveId" clId="{6C59C6E9-0E6E-420A-A1AB-10109172E705}"/>
     <pc:docChg chg="undo custSel addSld modSld addSection modSection">
-      <pc:chgData name="Konrad Ritter" userId="a6e8e9d6da2f7611" providerId="LiveId" clId="{6C59C6E9-0E6E-420A-A1AB-10109172E705}" dt="2025-08-10T16:54:03.212" v="10659" actId="20577"/>
+      <pc:chgData name="Konrad Ritter" userId="a6e8e9d6da2f7611" providerId="LiveId" clId="{6C59C6E9-0E6E-420A-A1AB-10109172E705}" dt="2025-08-10T17:25:27.856" v="11667" actId="20577"/>
       <pc:docMkLst>
         <pc:docMk/>
       </pc:docMkLst>
@@ -2847,7 +2851,7 @@
         </pc:picChg>
       </pc:sldChg>
       <pc:sldChg chg="addSp modSp new mod">
-        <pc:chgData name="Konrad Ritter" userId="a6e8e9d6da2f7611" providerId="LiveId" clId="{6C59C6E9-0E6E-420A-A1AB-10109172E705}" dt="2025-08-10T16:54:03.212" v="10659" actId="20577"/>
+        <pc:chgData name="Konrad Ritter" userId="a6e8e9d6da2f7611" providerId="LiveId" clId="{6C59C6E9-0E6E-420A-A1AB-10109172E705}" dt="2025-08-10T17:14:43.860" v="11027" actId="1076"/>
         <pc:sldMkLst>
           <pc:docMk/>
           <pc:sldMk cId="4274808363" sldId="305"/>
@@ -2861,7 +2865,7 @@
           </ac:spMkLst>
         </pc:spChg>
         <pc:spChg chg="add mod">
-          <ac:chgData name="Konrad Ritter" userId="a6e8e9d6da2f7611" providerId="LiveId" clId="{6C59C6E9-0E6E-420A-A1AB-10109172E705}" dt="2025-08-10T16:48:22.163" v="10361" actId="255"/>
+          <ac:chgData name="Konrad Ritter" userId="a6e8e9d6da2f7611" providerId="LiveId" clId="{6C59C6E9-0E6E-420A-A1AB-10109172E705}" dt="2025-08-10T17:14:43.860" v="11027" actId="1076"/>
           <ac:spMkLst>
             <pc:docMk/>
             <pc:sldMk cId="4274808363" sldId="305"/>
@@ -2869,7 +2873,7 @@
           </ac:spMkLst>
         </pc:spChg>
         <pc:spChg chg="add mod">
-          <ac:chgData name="Konrad Ritter" userId="a6e8e9d6da2f7611" providerId="LiveId" clId="{6C59C6E9-0E6E-420A-A1AB-10109172E705}" dt="2025-08-10T16:48:15.325" v="10360"/>
+          <ac:chgData name="Konrad Ritter" userId="a6e8e9d6da2f7611" providerId="LiveId" clId="{6C59C6E9-0E6E-420A-A1AB-10109172E705}" dt="2025-08-10T17:14:43.860" v="11027" actId="1076"/>
           <ac:spMkLst>
             <pc:docMk/>
             <pc:sldMk cId="4274808363" sldId="305"/>
@@ -2882,6 +2886,164 @@
             <pc:docMk/>
             <pc:sldMk cId="4274808363" sldId="305"/>
             <ac:spMk id="5" creationId="{4065D371-CDA9-50EB-1041-230D4E2C5003}"/>
+          </ac:spMkLst>
+        </pc:spChg>
+      </pc:sldChg>
+      <pc:sldChg chg="addSp modSp new mod">
+        <pc:chgData name="Konrad Ritter" userId="a6e8e9d6da2f7611" providerId="LiveId" clId="{6C59C6E9-0E6E-420A-A1AB-10109172E705}" dt="2025-08-10T17:11:44.960" v="11006" actId="20577"/>
+        <pc:sldMkLst>
+          <pc:docMk/>
+          <pc:sldMk cId="1355796584" sldId="306"/>
+        </pc:sldMkLst>
+        <pc:spChg chg="mod">
+          <ac:chgData name="Konrad Ritter" userId="a6e8e9d6da2f7611" providerId="LiveId" clId="{6C59C6E9-0E6E-420A-A1AB-10109172E705}" dt="2025-08-10T17:00:38.360" v="10674" actId="113"/>
+          <ac:spMkLst>
+            <pc:docMk/>
+            <pc:sldMk cId="1355796584" sldId="306"/>
+            <ac:spMk id="2" creationId="{EA8C4EE7-0E4C-5020-D942-158ED63CAC34}"/>
+          </ac:spMkLst>
+        </pc:spChg>
+        <pc:spChg chg="add mod">
+          <ac:chgData name="Konrad Ritter" userId="a6e8e9d6da2f7611" providerId="LiveId" clId="{6C59C6E9-0E6E-420A-A1AB-10109172E705}" dt="2025-08-10T17:01:56.086" v="10818" actId="20577"/>
+          <ac:spMkLst>
+            <pc:docMk/>
+            <pc:sldMk cId="1355796584" sldId="306"/>
+            <ac:spMk id="3" creationId="{40D2D9D7-31FF-2471-BF68-644FD7378EC7}"/>
+          </ac:spMkLst>
+        </pc:spChg>
+        <pc:spChg chg="add mod">
+          <ac:chgData name="Konrad Ritter" userId="a6e8e9d6da2f7611" providerId="LiveId" clId="{6C59C6E9-0E6E-420A-A1AB-10109172E705}" dt="2025-08-10T17:11:44.960" v="11006" actId="20577"/>
+          <ac:spMkLst>
+            <pc:docMk/>
+            <pc:sldMk cId="1355796584" sldId="306"/>
+            <ac:spMk id="4" creationId="{B17FE1BC-BAB1-D070-8499-111E1D5B683C}"/>
+          </ac:spMkLst>
+        </pc:spChg>
+        <pc:spChg chg="add mod">
+          <ac:chgData name="Konrad Ritter" userId="a6e8e9d6da2f7611" providerId="LiveId" clId="{6C59C6E9-0E6E-420A-A1AB-10109172E705}" dt="2025-08-10T17:11:01.102" v="10998" actId="14100"/>
+          <ac:spMkLst>
+            <pc:docMk/>
+            <pc:sldMk cId="1355796584" sldId="306"/>
+            <ac:spMk id="5" creationId="{B876D885-3696-1CDB-CF2B-A48B3247B544}"/>
+          </ac:spMkLst>
+        </pc:spChg>
+        <pc:spChg chg="mod">
+          <ac:chgData name="Konrad Ritter" userId="a6e8e9d6da2f7611" providerId="LiveId" clId="{6C59C6E9-0E6E-420A-A1AB-10109172E705}" dt="2025-08-10T17:10:49.961" v="10996"/>
+          <ac:spMkLst>
+            <pc:docMk/>
+            <pc:sldMk cId="1355796584" sldId="306"/>
+            <ac:spMk id="15" creationId="{72FFBF7A-8E68-5B01-0316-EF33FCB52CDE}"/>
+          </ac:spMkLst>
+        </pc:spChg>
+        <pc:grpChg chg="mod">
+          <ac:chgData name="Konrad Ritter" userId="a6e8e9d6da2f7611" providerId="LiveId" clId="{6C59C6E9-0E6E-420A-A1AB-10109172E705}" dt="2025-08-10T17:11:05.797" v="10999" actId="1076"/>
+          <ac:grpSpMkLst>
+            <pc:docMk/>
+            <pc:sldMk cId="1355796584" sldId="306"/>
+            <ac:grpSpMk id="6" creationId="{AEC3C0A9-E890-FD91-A651-8C9E26C9811B}"/>
+          </ac:grpSpMkLst>
+        </pc:grpChg>
+        <pc:picChg chg="mod">
+          <ac:chgData name="Konrad Ritter" userId="a6e8e9d6da2f7611" providerId="LiveId" clId="{6C59C6E9-0E6E-420A-A1AB-10109172E705}" dt="2025-08-10T17:10:49.961" v="10996"/>
+          <ac:picMkLst>
+            <pc:docMk/>
+            <pc:sldMk cId="1355796584" sldId="306"/>
+            <ac:picMk id="7" creationId="{E53E627E-5CCD-009D-4A5F-EA5943E7100D}"/>
+          </ac:picMkLst>
+        </pc:picChg>
+        <pc:picChg chg="mod">
+          <ac:chgData name="Konrad Ritter" userId="a6e8e9d6da2f7611" providerId="LiveId" clId="{6C59C6E9-0E6E-420A-A1AB-10109172E705}" dt="2025-08-10T17:10:49.961" v="10996"/>
+          <ac:picMkLst>
+            <pc:docMk/>
+            <pc:sldMk cId="1355796584" sldId="306"/>
+            <ac:picMk id="9" creationId="{B2D55419-BE08-F684-06FF-1F55310113F0}"/>
+          </ac:picMkLst>
+        </pc:picChg>
+        <pc:picChg chg="mod">
+          <ac:chgData name="Konrad Ritter" userId="a6e8e9d6da2f7611" providerId="LiveId" clId="{6C59C6E9-0E6E-420A-A1AB-10109172E705}" dt="2025-08-10T17:10:49.961" v="10996"/>
+          <ac:picMkLst>
+            <pc:docMk/>
+            <pc:sldMk cId="1355796584" sldId="306"/>
+            <ac:picMk id="10" creationId="{FE5FE656-EFDC-7DBF-E5CF-E283B5FFE3EB}"/>
+          </ac:picMkLst>
+        </pc:picChg>
+        <pc:picChg chg="mod">
+          <ac:chgData name="Konrad Ritter" userId="a6e8e9d6da2f7611" providerId="LiveId" clId="{6C59C6E9-0E6E-420A-A1AB-10109172E705}" dt="2025-08-10T17:10:49.961" v="10996"/>
+          <ac:picMkLst>
+            <pc:docMk/>
+            <pc:sldMk cId="1355796584" sldId="306"/>
+            <ac:picMk id="11" creationId="{096016C2-D7F4-8241-BDB4-3C9B7A48DA26}"/>
+          </ac:picMkLst>
+        </pc:picChg>
+        <pc:picChg chg="mod">
+          <ac:chgData name="Konrad Ritter" userId="a6e8e9d6da2f7611" providerId="LiveId" clId="{6C59C6E9-0E6E-420A-A1AB-10109172E705}" dt="2025-08-10T17:10:49.961" v="10996"/>
+          <ac:picMkLst>
+            <pc:docMk/>
+            <pc:sldMk cId="1355796584" sldId="306"/>
+            <ac:picMk id="12" creationId="{A6DC27BF-98D6-6342-F81D-DFA89DC1B36C}"/>
+          </ac:picMkLst>
+        </pc:picChg>
+        <pc:picChg chg="mod">
+          <ac:chgData name="Konrad Ritter" userId="a6e8e9d6da2f7611" providerId="LiveId" clId="{6C59C6E9-0E6E-420A-A1AB-10109172E705}" dt="2025-08-10T17:10:49.961" v="10996"/>
+          <ac:picMkLst>
+            <pc:docMk/>
+            <pc:sldMk cId="1355796584" sldId="306"/>
+            <ac:picMk id="13" creationId="{B557772E-9A44-5722-D729-8A72319FDD6A}"/>
+          </ac:picMkLst>
+        </pc:picChg>
+        <pc:picChg chg="mod">
+          <ac:chgData name="Konrad Ritter" userId="a6e8e9d6da2f7611" providerId="LiveId" clId="{6C59C6E9-0E6E-420A-A1AB-10109172E705}" dt="2025-08-10T17:10:49.961" v="10996"/>
+          <ac:picMkLst>
+            <pc:docMk/>
+            <pc:sldMk cId="1355796584" sldId="306"/>
+            <ac:picMk id="14" creationId="{9A956C41-B249-B0DB-3F4A-BDED1119AA12}"/>
+          </ac:picMkLst>
+        </pc:picChg>
+        <pc:picChg chg="mod">
+          <ac:chgData name="Konrad Ritter" userId="a6e8e9d6da2f7611" providerId="LiveId" clId="{6C59C6E9-0E6E-420A-A1AB-10109172E705}" dt="2025-08-10T17:10:49.961" v="10996"/>
+          <ac:picMkLst>
+            <pc:docMk/>
+            <pc:sldMk cId="1355796584" sldId="306"/>
+            <ac:picMk id="18" creationId="{8E1DD377-C1A0-1820-B224-0DFE3F8D3B3C}"/>
+          </ac:picMkLst>
+        </pc:picChg>
+      </pc:sldChg>
+      <pc:sldChg chg="addSp modSp new mod">
+        <pc:chgData name="Konrad Ritter" userId="a6e8e9d6da2f7611" providerId="LiveId" clId="{6C59C6E9-0E6E-420A-A1AB-10109172E705}" dt="2025-08-10T17:25:27.856" v="11667" actId="20577"/>
+        <pc:sldMkLst>
+          <pc:docMk/>
+          <pc:sldMk cId="1152672343" sldId="307"/>
+        </pc:sldMkLst>
+        <pc:spChg chg="mod">
+          <ac:chgData name="Konrad Ritter" userId="a6e8e9d6da2f7611" providerId="LiveId" clId="{6C59C6E9-0E6E-420A-A1AB-10109172E705}" dt="2025-08-10T17:13:16.144" v="11024" actId="113"/>
+          <ac:spMkLst>
+            <pc:docMk/>
+            <pc:sldMk cId="1152672343" sldId="307"/>
+            <ac:spMk id="2" creationId="{9BB413A7-239A-FBD5-5B4E-1B1C112BC674}"/>
+          </ac:spMkLst>
+        </pc:spChg>
+        <pc:spChg chg="add mod">
+          <ac:chgData name="Konrad Ritter" userId="a6e8e9d6da2f7611" providerId="LiveId" clId="{6C59C6E9-0E6E-420A-A1AB-10109172E705}" dt="2025-08-10T17:16:11.258" v="11302" actId="20577"/>
+          <ac:spMkLst>
+            <pc:docMk/>
+            <pc:sldMk cId="1152672343" sldId="307"/>
+            <ac:spMk id="3" creationId="{1D536B89-9A5C-094F-1FB1-3A59E74F2D40}"/>
+          </ac:spMkLst>
+        </pc:spChg>
+        <pc:spChg chg="add mod">
+          <ac:chgData name="Konrad Ritter" userId="a6e8e9d6da2f7611" providerId="LiveId" clId="{6C59C6E9-0E6E-420A-A1AB-10109172E705}" dt="2025-08-10T17:24:30.802" v="11555" actId="20577"/>
+          <ac:spMkLst>
+            <pc:docMk/>
+            <pc:sldMk cId="1152672343" sldId="307"/>
+            <ac:spMk id="4" creationId="{268A3AE1-6F46-DA9B-983F-30D8676FCDA1}"/>
+          </ac:spMkLst>
+        </pc:spChg>
+        <pc:spChg chg="add mod">
+          <ac:chgData name="Konrad Ritter" userId="a6e8e9d6da2f7611" providerId="LiveId" clId="{6C59C6E9-0E6E-420A-A1AB-10109172E705}" dt="2025-08-10T17:25:27.856" v="11667" actId="20577"/>
+          <ac:spMkLst>
+            <pc:docMk/>
+            <pc:sldMk cId="1152672343" sldId="307"/>
+            <ac:spMk id="5" creationId="{0E552B5F-7485-312A-C924-68C33A5F2463}"/>
           </ac:spMkLst>
         </pc:spChg>
       </pc:sldChg>
@@ -24533,7 +24695,7 @@
         </p:nvSpPr>
         <p:spPr>
           <a:xfrm>
-            <a:off x="0" y="1874982"/>
+            <a:off x="0" y="2059200"/>
             <a:ext cx="6096000" cy="2246769"/>
           </a:xfrm>
           <a:prstGeom prst="rect">
@@ -24575,7 +24737,7 @@
         </p:nvSpPr>
         <p:spPr>
           <a:xfrm>
-            <a:off x="6096000" y="2244436"/>
+            <a:off x="6096000" y="2059200"/>
             <a:ext cx="6096000" cy="4401205"/>
           </a:xfrm>
           <a:prstGeom prst="rect">
@@ -24723,13 +24885,8 @@
             </a:r>
             <a:r>
               <a:rPr lang="de-DE" dirty="0"/>
-              <a:t> von Rufzeicheninhaber und Azubi =&gt; Azubi funkt mit Rufzeichen und </a:t>
-            </a:r>
-            <a:r>
-              <a:rPr lang="de-DE"/>
-              <a:t>Haken (grün)</a:t>
-            </a:r>
-            <a:endParaRPr lang="de-DE" dirty="0"/>
+              <a:t> von Rufzeicheninhaber und Azubi =&gt; Azubi funkt mit Rufzeichen und Haken (grün)</a:t>
+            </a:r>
           </a:p>
           <a:p>
             <a:r>
@@ -24744,6 +24901,1024 @@
     <p:extLst>
       <p:ext uri="{BB962C8B-B14F-4D97-AF65-F5344CB8AC3E}">
         <p14:creationId xmlns:p14="http://schemas.microsoft.com/office/powerpoint/2010/main" val="4274808363"/>
+      </p:ext>
+    </p:extLst>
+  </p:cSld>
+  <p:clrMapOvr>
+    <a:masterClrMapping/>
+  </p:clrMapOvr>
+</p:sld>
+</file>
+
+<file path=ppt/slides/slide42.xml><?xml version="1.0" encoding="utf-8"?>
+<p:sld xmlns:a="http://schemas.openxmlformats.org/drawingml/2006/main" xmlns:r="http://schemas.openxmlformats.org/officeDocument/2006/relationships" xmlns:p="http://schemas.openxmlformats.org/presentationml/2006/main">
+  <p:cSld>
+    <p:spTree>
+      <p:nvGrpSpPr>
+        <p:cNvPr id="1" name=""/>
+        <p:cNvGrpSpPr/>
+        <p:nvPr/>
+      </p:nvGrpSpPr>
+      <p:grpSpPr>
+        <a:xfrm>
+          <a:off x="0" y="0"/>
+          <a:ext cx="0" cy="0"/>
+          <a:chOff x="0" y="0"/>
+          <a:chExt cx="0" cy="0"/>
+        </a:xfrm>
+      </p:grpSpPr>
+      <p:sp>
+        <p:nvSpPr>
+          <p:cNvPr id="2" name="Textplatzhalter 1">
+            <a:extLst>
+              <a:ext uri="{FF2B5EF4-FFF2-40B4-BE49-F238E27FC236}">
+                <a16:creationId xmlns:a16="http://schemas.microsoft.com/office/drawing/2014/main" id="{EA8C4EE7-0E4C-5020-D942-158ED63CAC34}"/>
+              </a:ext>
+            </a:extLst>
+          </p:cNvPr>
+          <p:cNvSpPr>
+            <a:spLocks noGrp="1"/>
+          </p:cNvSpPr>
+          <p:nvPr>
+            <p:ph type="body" sz="quarter" idx="10"/>
+          </p:nvPr>
+        </p:nvSpPr>
+        <p:spPr/>
+        <p:txBody>
+          <a:bodyPr/>
+          <a:lstStyle/>
+          <a:p>
+            <a:r>
+              <a:rPr lang="de-DE" b="1" dirty="0"/>
+              <a:t>VC108 Ist nach dem Amateurfunkgesetz (AFuG) für die Erteilung einer Amateurfunkzulassung ein Mindestalter erforderlich?</a:t>
+            </a:r>
+          </a:p>
+          <a:p>
+            <a:endParaRPr lang="de-DE" dirty="0"/>
+          </a:p>
+          <a:p>
+            <a:r>
+              <a:rPr lang="de-DE" u="sng" dirty="0"/>
+              <a:t>A Das Amateurfunkgesetz (AFuG) sieht kein Mindestalter vor.</a:t>
+            </a:r>
+            <a:endParaRPr lang="en-GB" u="sng" dirty="0"/>
+          </a:p>
+        </p:txBody>
+      </p:sp>
+      <p:sp>
+        <p:nvSpPr>
+          <p:cNvPr id="3" name="Textfeld 2">
+            <a:extLst>
+              <a:ext uri="{FF2B5EF4-FFF2-40B4-BE49-F238E27FC236}">
+                <a16:creationId xmlns:a16="http://schemas.microsoft.com/office/drawing/2014/main" id="{40D2D9D7-31FF-2471-BF68-644FD7378EC7}"/>
+              </a:ext>
+            </a:extLst>
+          </p:cNvPr>
+          <p:cNvSpPr txBox="1"/>
+          <p:nvPr/>
+        </p:nvSpPr>
+        <p:spPr>
+          <a:xfrm>
+            <a:off x="0" y="1874982"/>
+            <a:ext cx="6096000" cy="1015663"/>
+          </a:xfrm>
+          <a:prstGeom prst="rect">
+            <a:avLst/>
+          </a:prstGeom>
+          <a:noFill/>
+        </p:spPr>
+        <p:txBody>
+          <a:bodyPr wrap="square" rtlCol="0">
+            <a:spAutoFit/>
+          </a:bodyPr>
+          <a:lstStyle/>
+          <a:p>
+            <a:r>
+              <a:rPr lang="de-DE" sz="2000" dirty="0"/>
+              <a:t>Obwohl Männer im AFU typischerweise als „Old Man“ (alter Mann) kurz OM bezeichnet werden, dürfen auch Kinder schon eine Lizenz machen. </a:t>
+            </a:r>
+            <a:endParaRPr lang="en-GB" sz="2000" dirty="0"/>
+          </a:p>
+        </p:txBody>
+      </p:sp>
+      <p:sp>
+        <p:nvSpPr>
+          <p:cNvPr id="4" name="Textfeld 3">
+            <a:extLst>
+              <a:ext uri="{FF2B5EF4-FFF2-40B4-BE49-F238E27FC236}">
+                <a16:creationId xmlns:a16="http://schemas.microsoft.com/office/drawing/2014/main" id="{B17FE1BC-BAB1-D070-8499-111E1D5B683C}"/>
+              </a:ext>
+            </a:extLst>
+          </p:cNvPr>
+          <p:cNvSpPr txBox="1"/>
+          <p:nvPr/>
+        </p:nvSpPr>
+        <p:spPr>
+          <a:xfrm>
+            <a:off x="0" y="3026664"/>
+            <a:ext cx="6096000" cy="1200329"/>
+          </a:xfrm>
+          <a:prstGeom prst="rect">
+            <a:avLst/>
+          </a:prstGeom>
+          <a:noFill/>
+        </p:spPr>
+        <p:txBody>
+          <a:bodyPr wrap="square" rtlCol="0">
+            <a:spAutoFit/>
+          </a:bodyPr>
+          <a:lstStyle/>
+          <a:p>
+            <a:r>
+              <a:rPr lang="en-GB" dirty="0"/>
+              <a:t>2022 war DH9FD </a:t>
+            </a:r>
+            <a:r>
+              <a:rPr lang="en-GB" dirty="0" err="1"/>
+              <a:t>mit</a:t>
+            </a:r>
+            <a:r>
+              <a:rPr lang="en-GB" dirty="0"/>
+              <a:t> 13 Jahren die </a:t>
+            </a:r>
+            <a:r>
+              <a:rPr lang="en-GB" dirty="0" err="1"/>
+              <a:t>jüngste</a:t>
+            </a:r>
+            <a:r>
+              <a:rPr lang="en-GB" dirty="0"/>
+              <a:t> </a:t>
+            </a:r>
+            <a:r>
+              <a:rPr lang="en-GB" dirty="0" err="1"/>
+              <a:t>Rufzeicheninhaber:in</a:t>
+            </a:r>
+            <a:r>
+              <a:rPr lang="en-GB" dirty="0"/>
+              <a:t> </a:t>
+            </a:r>
+            <a:r>
+              <a:rPr lang="en-GB" dirty="0" err="1"/>
+              <a:t>Deutschlands</a:t>
+            </a:r>
+            <a:r>
+              <a:rPr lang="en-GB" dirty="0"/>
+              <a:t>.</a:t>
+            </a:r>
+          </a:p>
+          <a:p>
+            <a:r>
+              <a:rPr lang="en-GB" dirty="0"/>
+              <a:t>2023 </a:t>
+            </a:r>
+            <a:r>
+              <a:rPr lang="en-GB" dirty="0" err="1"/>
+              <a:t>kam</a:t>
+            </a:r>
+            <a:r>
+              <a:rPr lang="en-GB" dirty="0"/>
+              <a:t> DO9JF </a:t>
+            </a:r>
+            <a:r>
+              <a:rPr lang="en-GB" dirty="0" err="1"/>
+              <a:t>mit</a:t>
+            </a:r>
+            <a:r>
+              <a:rPr lang="en-GB" dirty="0"/>
+              <a:t> 12 Jahren </a:t>
+            </a:r>
+            <a:r>
+              <a:rPr lang="en-GB" dirty="0" err="1"/>
+              <a:t>hinzu</a:t>
+            </a:r>
+            <a:r>
+              <a:rPr lang="en-GB" dirty="0"/>
+              <a:t>, </a:t>
+            </a:r>
+            <a:r>
+              <a:rPr lang="en-GB" dirty="0" err="1"/>
+              <a:t>gefolgt</a:t>
+            </a:r>
+            <a:r>
+              <a:rPr lang="en-GB" dirty="0"/>
+              <a:t> von DN9MM (12 Jahre) </a:t>
+            </a:r>
+            <a:r>
+              <a:rPr lang="en-GB" dirty="0" err="1"/>
+              <a:t>im</a:t>
+            </a:r>
+            <a:r>
+              <a:rPr lang="en-GB" dirty="0"/>
+              <a:t> Jahr 2024.</a:t>
+            </a:r>
+          </a:p>
+        </p:txBody>
+      </p:sp>
+      <p:sp>
+        <p:nvSpPr>
+          <p:cNvPr id="5" name="Textfeld 4">
+            <a:extLst>
+              <a:ext uri="{FF2B5EF4-FFF2-40B4-BE49-F238E27FC236}">
+                <a16:creationId xmlns:a16="http://schemas.microsoft.com/office/drawing/2014/main" id="{B876D885-3696-1CDB-CF2B-A48B3247B544}"/>
+              </a:ext>
+            </a:extLst>
+          </p:cNvPr>
+          <p:cNvSpPr txBox="1"/>
+          <p:nvPr/>
+        </p:nvSpPr>
+        <p:spPr>
+          <a:xfrm>
+            <a:off x="5821124" y="2983345"/>
+            <a:ext cx="6370875" cy="1200329"/>
+          </a:xfrm>
+          <a:prstGeom prst="rect">
+            <a:avLst/>
+          </a:prstGeom>
+          <a:noFill/>
+        </p:spPr>
+        <p:txBody>
+          <a:bodyPr wrap="square" rtlCol="0">
+            <a:spAutoFit/>
+          </a:bodyPr>
+          <a:lstStyle/>
+          <a:p>
+            <a:pPr algn="ctr"/>
+            <a:r>
+              <a:rPr lang="de-DE" sz="2400" dirty="0"/>
+              <a:t>Hier gilt:</a:t>
+            </a:r>
+          </a:p>
+          <a:p>
+            <a:pPr algn="ctr"/>
+            <a:r>
+              <a:rPr lang="de-DE" sz="2400" dirty="0"/>
+              <a:t>Kann man nicht verstehen, muss man wissen.</a:t>
+            </a:r>
+          </a:p>
+          <a:p>
+            <a:pPr algn="ctr"/>
+            <a:r>
+              <a:rPr lang="de-DE" sz="2400" dirty="0"/>
+              <a:t>Ergo: Auswendiglernen.</a:t>
+            </a:r>
+            <a:endParaRPr lang="en-GB" sz="2400" dirty="0"/>
+          </a:p>
+        </p:txBody>
+      </p:sp>
+      <p:grpSp>
+        <p:nvGrpSpPr>
+          <p:cNvPr id="6" name="Gruppieren 5">
+            <a:extLst>
+              <a:ext uri="{FF2B5EF4-FFF2-40B4-BE49-F238E27FC236}">
+                <a16:creationId xmlns:a16="http://schemas.microsoft.com/office/drawing/2014/main" id="{AEC3C0A9-E890-FD91-A651-8C9E26C9811B}"/>
+              </a:ext>
+            </a:extLst>
+          </p:cNvPr>
+          <p:cNvGrpSpPr/>
+          <p:nvPr/>
+        </p:nvGrpSpPr>
+        <p:grpSpPr>
+          <a:xfrm>
+            <a:off x="2042615" y="4627019"/>
+            <a:ext cx="8106769" cy="1855511"/>
+            <a:chOff x="2209890" y="4537356"/>
+            <a:chExt cx="8106769" cy="1855511"/>
+          </a:xfrm>
+        </p:grpSpPr>
+        <p:pic>
+          <p:nvPicPr>
+            <p:cNvPr id="7" name="Grafik 6" descr="Abschlusshut Silhouette">
+              <a:extLst>
+                <a:ext uri="{FF2B5EF4-FFF2-40B4-BE49-F238E27FC236}">
+                  <a16:creationId xmlns:a16="http://schemas.microsoft.com/office/drawing/2014/main" id="{E53E627E-5CCD-009D-4A5F-EA5943E7100D}"/>
+                </a:ext>
+              </a:extLst>
+            </p:cNvPr>
+            <p:cNvPicPr>
+              <a:picLocks noChangeAspect="1"/>
+            </p:cNvPicPr>
+            <p:nvPr/>
+          </p:nvPicPr>
+          <p:blipFill>
+            <a:blip r:embed="rId2">
+              <a:extLst>
+                <a:ext uri="{96DAC541-7B7A-43D3-8B79-37D633B846F1}">
+                  <asvg:svgBlip xmlns:asvg="http://schemas.microsoft.com/office/drawing/2016/SVG/main" r:embed="rId3"/>
+                </a:ext>
+              </a:extLst>
+            </a:blip>
+            <a:stretch>
+              <a:fillRect/>
+            </a:stretch>
+          </p:blipFill>
+          <p:spPr>
+            <a:xfrm>
+              <a:off x="8487859" y="4593877"/>
+              <a:ext cx="914400" cy="914400"/>
+            </a:xfrm>
+            <a:prstGeom prst="rect">
+              <a:avLst/>
+            </a:prstGeom>
+          </p:spPr>
+        </p:pic>
+        <p:pic>
+          <p:nvPicPr>
+            <p:cNvPr id="8" name="Grafik 7" descr="Gedanken Silhouette">
+              <a:extLst>
+                <a:ext uri="{FF2B5EF4-FFF2-40B4-BE49-F238E27FC236}">
+                  <a16:creationId xmlns:a16="http://schemas.microsoft.com/office/drawing/2014/main" id="{74F4691F-6AC0-31F3-9FDE-A2A6E1ACF559}"/>
+                </a:ext>
+              </a:extLst>
+            </p:cNvPr>
+            <p:cNvPicPr>
+              <a:picLocks noChangeAspect="1"/>
+            </p:cNvPicPr>
+            <p:nvPr/>
+          </p:nvPicPr>
+          <p:blipFill>
+            <a:blip r:embed="rId4">
+              <a:extLst>
+                <a:ext uri="{96DAC541-7B7A-43D3-8B79-37D633B846F1}">
+                  <asvg:svgBlip xmlns:asvg="http://schemas.microsoft.com/office/drawing/2016/SVG/main" r:embed="rId5"/>
+                </a:ext>
+              </a:extLst>
+            </a:blip>
+            <a:stretch>
+              <a:fillRect/>
+            </a:stretch>
+          </p:blipFill>
+          <p:spPr>
+            <a:xfrm>
+              <a:off x="2209890" y="4734940"/>
+              <a:ext cx="1657927" cy="1657927"/>
+            </a:xfrm>
+            <a:prstGeom prst="rect">
+              <a:avLst/>
+            </a:prstGeom>
+          </p:spPr>
+        </p:pic>
+        <p:pic>
+          <p:nvPicPr>
+            <p:cNvPr id="9" name="Grafik 8" descr="Fragezeichen Silhouette">
+              <a:extLst>
+                <a:ext uri="{FF2B5EF4-FFF2-40B4-BE49-F238E27FC236}">
+                  <a16:creationId xmlns:a16="http://schemas.microsoft.com/office/drawing/2014/main" id="{B2D55419-BE08-F684-06FF-1F55310113F0}"/>
+                </a:ext>
+              </a:extLst>
+            </p:cNvPr>
+            <p:cNvPicPr>
+              <a:picLocks noChangeAspect="1"/>
+            </p:cNvPicPr>
+            <p:nvPr/>
+          </p:nvPicPr>
+          <p:blipFill>
+            <a:blip r:embed="rId6">
+              <a:extLst>
+                <a:ext uri="{96DAC541-7B7A-43D3-8B79-37D633B846F1}">
+                  <asvg:svgBlip xmlns:asvg="http://schemas.microsoft.com/office/drawing/2016/SVG/main" r:embed="rId7"/>
+                </a:ext>
+              </a:extLst>
+            </a:blip>
+            <a:stretch>
+              <a:fillRect/>
+            </a:stretch>
+          </p:blipFill>
+          <p:spPr>
+            <a:xfrm>
+              <a:off x="2787163" y="4845169"/>
+              <a:ext cx="780473" cy="780473"/>
+            </a:xfrm>
+            <a:prstGeom prst="rect">
+              <a:avLst/>
+            </a:prstGeom>
+          </p:spPr>
+        </p:pic>
+        <p:pic>
+          <p:nvPicPr>
+            <p:cNvPr id="10" name="Grafik 9" descr="Hinzufügen mit einfarbiger Füllung">
+              <a:extLst>
+                <a:ext uri="{FF2B5EF4-FFF2-40B4-BE49-F238E27FC236}">
+                  <a16:creationId xmlns:a16="http://schemas.microsoft.com/office/drawing/2014/main" id="{FE5FE656-EFDC-7DBF-E5CF-E283B5FFE3EB}"/>
+                </a:ext>
+              </a:extLst>
+            </p:cNvPr>
+            <p:cNvPicPr>
+              <a:picLocks noChangeAspect="1"/>
+            </p:cNvPicPr>
+            <p:nvPr/>
+          </p:nvPicPr>
+          <p:blipFill>
+            <a:blip r:embed="rId8">
+              <a:extLst>
+                <a:ext uri="{96DAC541-7B7A-43D3-8B79-37D633B846F1}">
+                  <asvg:svgBlip xmlns:asvg="http://schemas.microsoft.com/office/drawing/2016/SVG/main" r:embed="rId9"/>
+                </a:ext>
+              </a:extLst>
+            </a:blip>
+            <a:stretch>
+              <a:fillRect/>
+            </a:stretch>
+          </p:blipFill>
+          <p:spPr>
+            <a:xfrm>
+              <a:off x="3930071" y="5042231"/>
+              <a:ext cx="914400" cy="914400"/>
+            </a:xfrm>
+            <a:prstGeom prst="rect">
+              <a:avLst/>
+            </a:prstGeom>
+          </p:spPr>
+        </p:pic>
+        <p:pic>
+          <p:nvPicPr>
+            <p:cNvPr id="11" name="Grafik 10" descr="Klassenzimmer mit einfarbiger Füllung">
+              <a:extLst>
+                <a:ext uri="{FF2B5EF4-FFF2-40B4-BE49-F238E27FC236}">
+                  <a16:creationId xmlns:a16="http://schemas.microsoft.com/office/drawing/2014/main" id="{096016C2-D7F4-8241-BDB4-3C9B7A48DA26}"/>
+                </a:ext>
+              </a:extLst>
+            </p:cNvPr>
+            <p:cNvPicPr>
+              <a:picLocks noChangeAspect="1"/>
+            </p:cNvPicPr>
+            <p:nvPr/>
+          </p:nvPicPr>
+          <p:blipFill>
+            <a:blip r:embed="rId10">
+              <a:extLst>
+                <a:ext uri="{96DAC541-7B7A-43D3-8B79-37D633B846F1}">
+                  <asvg:svgBlip xmlns:asvg="http://schemas.microsoft.com/office/drawing/2016/SVG/main" r:embed="rId11"/>
+                </a:ext>
+              </a:extLst>
+            </a:blip>
+            <a:stretch>
+              <a:fillRect/>
+            </a:stretch>
+          </p:blipFill>
+          <p:spPr>
+            <a:xfrm>
+              <a:off x="4906725" y="4585031"/>
+              <a:ext cx="914400" cy="914400"/>
+            </a:xfrm>
+            <a:prstGeom prst="rect">
+              <a:avLst/>
+            </a:prstGeom>
+          </p:spPr>
+        </p:pic>
+        <p:pic>
+          <p:nvPicPr>
+            <p:cNvPr id="12" name="Grafik 11" descr="Idee Silhouette">
+              <a:extLst>
+                <a:ext uri="{FF2B5EF4-FFF2-40B4-BE49-F238E27FC236}">
+                  <a16:creationId xmlns:a16="http://schemas.microsoft.com/office/drawing/2014/main" id="{A6DC27BF-98D6-6342-F81D-DFA89DC1B36C}"/>
+                </a:ext>
+              </a:extLst>
+            </p:cNvPr>
+            <p:cNvPicPr>
+              <a:picLocks noChangeAspect="1"/>
+            </p:cNvPicPr>
+            <p:nvPr/>
+          </p:nvPicPr>
+          <p:blipFill>
+            <a:blip r:embed="rId12">
+              <a:extLst>
+                <a:ext uri="{96DAC541-7B7A-43D3-8B79-37D633B846F1}">
+                  <asvg:svgBlip xmlns:asvg="http://schemas.microsoft.com/office/drawing/2016/SVG/main" r:embed="rId13"/>
+                </a:ext>
+              </a:extLst>
+            </a:blip>
+            <a:stretch>
+              <a:fillRect/>
+            </a:stretch>
+          </p:blipFill>
+          <p:spPr>
+            <a:xfrm>
+              <a:off x="4906725" y="5478467"/>
+              <a:ext cx="914400" cy="914400"/>
+            </a:xfrm>
+            <a:prstGeom prst="rect">
+              <a:avLst/>
+            </a:prstGeom>
+          </p:spPr>
+        </p:pic>
+        <p:pic>
+          <p:nvPicPr>
+            <p:cNvPr id="13" name="Grafik 12" descr="Geöffnetes Buch Silhouette">
+              <a:extLst>
+                <a:ext uri="{FF2B5EF4-FFF2-40B4-BE49-F238E27FC236}">
+                  <a16:creationId xmlns:a16="http://schemas.microsoft.com/office/drawing/2014/main" id="{B557772E-9A44-5722-D729-8A72319FDD6A}"/>
+                </a:ext>
+              </a:extLst>
+            </p:cNvPr>
+            <p:cNvPicPr>
+              <a:picLocks noChangeAspect="1"/>
+            </p:cNvPicPr>
+            <p:nvPr/>
+          </p:nvPicPr>
+          <p:blipFill>
+            <a:blip r:embed="rId14">
+              <a:extLst>
+                <a:ext uri="{96DAC541-7B7A-43D3-8B79-37D633B846F1}">
+                  <asvg:svgBlip xmlns:asvg="http://schemas.microsoft.com/office/drawing/2016/SVG/main" r:embed="rId15"/>
+                </a:ext>
+              </a:extLst>
+            </a:blip>
+            <a:stretch>
+              <a:fillRect/>
+            </a:stretch>
+          </p:blipFill>
+          <p:spPr>
+            <a:xfrm>
+              <a:off x="5821125" y="4585031"/>
+              <a:ext cx="914400" cy="914400"/>
+            </a:xfrm>
+            <a:prstGeom prst="rect">
+              <a:avLst/>
+            </a:prstGeom>
+          </p:spPr>
+        </p:pic>
+        <p:pic>
+          <p:nvPicPr>
+            <p:cNvPr id="14" name="Grafik 13" descr="Fernstudium Sprache Silhouette">
+              <a:extLst>
+                <a:ext uri="{FF2B5EF4-FFF2-40B4-BE49-F238E27FC236}">
+                  <a16:creationId xmlns:a16="http://schemas.microsoft.com/office/drawing/2014/main" id="{9A956C41-B249-B0DB-3F4A-BDED1119AA12}"/>
+                </a:ext>
+              </a:extLst>
+            </p:cNvPr>
+            <p:cNvPicPr>
+              <a:picLocks noChangeAspect="1"/>
+            </p:cNvPicPr>
+            <p:nvPr/>
+          </p:nvPicPr>
+          <p:blipFill>
+            <a:blip r:embed="rId16">
+              <a:extLst>
+                <a:ext uri="{96DAC541-7B7A-43D3-8B79-37D633B846F1}">
+                  <asvg:svgBlip xmlns:asvg="http://schemas.microsoft.com/office/drawing/2016/SVG/main" r:embed="rId17"/>
+                </a:ext>
+              </a:extLst>
+            </a:blip>
+            <a:stretch>
+              <a:fillRect/>
+            </a:stretch>
+          </p:blipFill>
+          <p:spPr>
+            <a:xfrm>
+              <a:off x="5821125" y="5478467"/>
+              <a:ext cx="914400" cy="914400"/>
+            </a:xfrm>
+            <a:prstGeom prst="rect">
+              <a:avLst/>
+            </a:prstGeom>
+          </p:spPr>
+        </p:pic>
+        <p:sp>
+          <p:nvSpPr>
+            <p:cNvPr id="15" name="Textfeld 14">
+              <a:extLst>
+                <a:ext uri="{FF2B5EF4-FFF2-40B4-BE49-F238E27FC236}">
+                  <a16:creationId xmlns:a16="http://schemas.microsoft.com/office/drawing/2014/main" id="{72FFBF7A-8E68-5B01-0316-EF33FCB52CDE}"/>
+                </a:ext>
+              </a:extLst>
+            </p:cNvPr>
+            <p:cNvSpPr txBox="1"/>
+            <p:nvPr/>
+          </p:nvSpPr>
+          <p:spPr>
+            <a:xfrm>
+              <a:off x="7383092" y="4734940"/>
+              <a:ext cx="914400" cy="1631216"/>
+            </a:xfrm>
+            <a:prstGeom prst="rect">
+              <a:avLst/>
+            </a:prstGeom>
+            <a:noFill/>
+          </p:spPr>
+          <p:txBody>
+            <a:bodyPr wrap="square" rtlCol="0">
+              <a:spAutoFit/>
+            </a:bodyPr>
+            <a:lstStyle/>
+            <a:p>
+              <a:r>
+                <a:rPr lang="de-DE" sz="10000" dirty="0"/>
+                <a:t>=</a:t>
+              </a:r>
+              <a:endParaRPr lang="en-GB" sz="10000" dirty="0"/>
+            </a:p>
+          </p:txBody>
+        </p:sp>
+        <p:pic>
+          <p:nvPicPr>
+            <p:cNvPr id="16" name="Grafik 15" descr="Vertrag Silhouette">
+              <a:extLst>
+                <a:ext uri="{FF2B5EF4-FFF2-40B4-BE49-F238E27FC236}">
+                  <a16:creationId xmlns:a16="http://schemas.microsoft.com/office/drawing/2014/main" id="{3E6E94A8-B588-939B-1E34-C7D4AEF7D014}"/>
+                </a:ext>
+              </a:extLst>
+            </p:cNvPr>
+            <p:cNvPicPr>
+              <a:picLocks noChangeAspect="1"/>
+            </p:cNvPicPr>
+            <p:nvPr/>
+          </p:nvPicPr>
+          <p:blipFill>
+            <a:blip r:embed="rId18">
+              <a:extLst>
+                <a:ext uri="{96DAC541-7B7A-43D3-8B79-37D633B846F1}">
+                  <asvg:svgBlip xmlns:asvg="http://schemas.microsoft.com/office/drawing/2016/SVG/main" r:embed="rId19"/>
+                </a:ext>
+              </a:extLst>
+            </a:blip>
+            <a:stretch>
+              <a:fillRect/>
+            </a:stretch>
+          </p:blipFill>
+          <p:spPr>
+            <a:xfrm>
+              <a:off x="8487859" y="5451756"/>
+              <a:ext cx="914400" cy="914400"/>
+            </a:xfrm>
+            <a:prstGeom prst="rect">
+              <a:avLst/>
+            </a:prstGeom>
+          </p:spPr>
+        </p:pic>
+        <p:pic>
+          <p:nvPicPr>
+            <p:cNvPr id="17" name="Grafik 16" descr="Schriftrolle Silhouette">
+              <a:extLst>
+                <a:ext uri="{FF2B5EF4-FFF2-40B4-BE49-F238E27FC236}">
+                  <a16:creationId xmlns:a16="http://schemas.microsoft.com/office/drawing/2014/main" id="{57002BC9-9A47-0EE0-1C16-1E0111AC4494}"/>
+                </a:ext>
+              </a:extLst>
+            </p:cNvPr>
+            <p:cNvPicPr>
+              <a:picLocks noChangeAspect="1"/>
+            </p:cNvPicPr>
+            <p:nvPr/>
+          </p:nvPicPr>
+          <p:blipFill>
+            <a:blip r:embed="rId20">
+              <a:extLst>
+                <a:ext uri="{96DAC541-7B7A-43D3-8B79-37D633B846F1}">
+                  <asvg:svgBlip xmlns:asvg="http://schemas.microsoft.com/office/drawing/2016/SVG/main" r:embed="rId21"/>
+                </a:ext>
+              </a:extLst>
+            </a:blip>
+            <a:stretch>
+              <a:fillRect/>
+            </a:stretch>
+          </p:blipFill>
+          <p:spPr>
+            <a:xfrm>
+              <a:off x="9402259" y="5451756"/>
+              <a:ext cx="914400" cy="914400"/>
+            </a:xfrm>
+            <a:prstGeom prst="rect">
+              <a:avLst/>
+            </a:prstGeom>
+          </p:spPr>
+        </p:pic>
+        <p:pic>
+          <p:nvPicPr>
+            <p:cNvPr id="18" name="Grafik 17" descr="Feuerwerk Silhouette">
+              <a:extLst>
+                <a:ext uri="{FF2B5EF4-FFF2-40B4-BE49-F238E27FC236}">
+                  <a16:creationId xmlns:a16="http://schemas.microsoft.com/office/drawing/2014/main" id="{8E1DD377-C1A0-1820-B224-0DFE3F8D3B3C}"/>
+                </a:ext>
+              </a:extLst>
+            </p:cNvPr>
+            <p:cNvPicPr>
+              <a:picLocks noChangeAspect="1"/>
+            </p:cNvPicPr>
+            <p:nvPr/>
+          </p:nvPicPr>
+          <p:blipFill>
+            <a:blip r:embed="rId22">
+              <a:extLst>
+                <a:ext uri="{96DAC541-7B7A-43D3-8B79-37D633B846F1}">
+                  <asvg:svgBlip xmlns:asvg="http://schemas.microsoft.com/office/drawing/2016/SVG/main" r:embed="rId23"/>
+                </a:ext>
+              </a:extLst>
+            </a:blip>
+            <a:stretch>
+              <a:fillRect/>
+            </a:stretch>
+          </p:blipFill>
+          <p:spPr>
+            <a:xfrm>
+              <a:off x="9402259" y="4537356"/>
+              <a:ext cx="914400" cy="914400"/>
+            </a:xfrm>
+            <a:prstGeom prst="rect">
+              <a:avLst/>
+            </a:prstGeom>
+          </p:spPr>
+        </p:pic>
+      </p:grpSp>
+    </p:spTree>
+    <p:extLst>
+      <p:ext uri="{BB962C8B-B14F-4D97-AF65-F5344CB8AC3E}">
+        <p14:creationId xmlns:p14="http://schemas.microsoft.com/office/powerpoint/2010/main" val="1355796584"/>
+      </p:ext>
+    </p:extLst>
+  </p:cSld>
+  <p:clrMapOvr>
+    <a:masterClrMapping/>
+  </p:clrMapOvr>
+</p:sld>
+</file>
+
+<file path=ppt/slides/slide43.xml><?xml version="1.0" encoding="utf-8"?>
+<p:sld xmlns:a="http://schemas.openxmlformats.org/drawingml/2006/main" xmlns:r="http://schemas.openxmlformats.org/officeDocument/2006/relationships" xmlns:p="http://schemas.openxmlformats.org/presentationml/2006/main">
+  <p:cSld>
+    <p:spTree>
+      <p:nvGrpSpPr>
+        <p:cNvPr id="1" name=""/>
+        <p:cNvGrpSpPr/>
+        <p:nvPr/>
+      </p:nvGrpSpPr>
+      <p:grpSpPr>
+        <a:xfrm>
+          <a:off x="0" y="0"/>
+          <a:ext cx="0" cy="0"/>
+          <a:chOff x="0" y="0"/>
+          <a:chExt cx="0" cy="0"/>
+        </a:xfrm>
+      </p:grpSpPr>
+      <p:sp>
+        <p:nvSpPr>
+          <p:cNvPr id="2" name="Textplatzhalter 1">
+            <a:extLst>
+              <a:ext uri="{FF2B5EF4-FFF2-40B4-BE49-F238E27FC236}">
+                <a16:creationId xmlns:a16="http://schemas.microsoft.com/office/drawing/2014/main" id="{9BB413A7-239A-FBD5-5B4E-1B1C112BC674}"/>
+              </a:ext>
+            </a:extLst>
+          </p:cNvPr>
+          <p:cNvSpPr>
+            <a:spLocks noGrp="1"/>
+          </p:cNvSpPr>
+          <p:nvPr>
+            <p:ph type="body" sz="quarter" idx="10"/>
+          </p:nvPr>
+        </p:nvSpPr>
+        <p:spPr/>
+        <p:txBody>
+          <a:bodyPr/>
+          <a:lstStyle/>
+          <a:p>
+            <a:r>
+              <a:rPr lang="de-DE" b="1" dirty="0"/>
+              <a:t>VC109 Welches Recht haben Funkamateure in Bezug auf den Betrieb von Sendeanlagen? Ein Funkamateur ...</a:t>
+            </a:r>
+          </a:p>
+          <a:p>
+            <a:endParaRPr lang="de-DE" dirty="0"/>
+          </a:p>
+          <a:p>
+            <a:r>
+              <a:rPr lang="de-DE" u="sng" dirty="0"/>
+              <a:t>A ist berechtigt, im Handel erhältliche, selbst gefertigte oder auf Amateurfunkfrequenzen umgebaute Sendeanlagen zu betreiben.</a:t>
+            </a:r>
+            <a:endParaRPr lang="en-GB" u="sng" dirty="0"/>
+          </a:p>
+        </p:txBody>
+      </p:sp>
+      <p:sp>
+        <p:nvSpPr>
+          <p:cNvPr id="3" name="Textfeld 2">
+            <a:extLst>
+              <a:ext uri="{FF2B5EF4-FFF2-40B4-BE49-F238E27FC236}">
+                <a16:creationId xmlns:a16="http://schemas.microsoft.com/office/drawing/2014/main" id="{1D536B89-9A5C-094F-1FB1-3A59E74F2D40}"/>
+              </a:ext>
+            </a:extLst>
+          </p:cNvPr>
+          <p:cNvSpPr txBox="1"/>
+          <p:nvPr/>
+        </p:nvSpPr>
+        <p:spPr>
+          <a:xfrm>
+            <a:off x="0" y="2059200"/>
+            <a:ext cx="6096000" cy="1631216"/>
+          </a:xfrm>
+          <a:prstGeom prst="rect">
+            <a:avLst/>
+          </a:prstGeom>
+          <a:noFill/>
+        </p:spPr>
+        <p:txBody>
+          <a:bodyPr wrap="square" rtlCol="0">
+            <a:spAutoFit/>
+          </a:bodyPr>
+          <a:lstStyle/>
+          <a:p>
+            <a:r>
+              <a:rPr lang="de-DE" sz="2000" dirty="0"/>
+              <a:t>Das „Recht zu basteln“ ist eines der größten Rechte der </a:t>
+            </a:r>
+            <a:r>
+              <a:rPr lang="de-DE" sz="2000" dirty="0" err="1"/>
+              <a:t>Funkamateur:innen</a:t>
+            </a:r>
+            <a:r>
+              <a:rPr lang="de-DE" sz="2000" dirty="0"/>
+              <a:t>. In den </a:t>
+            </a:r>
+            <a:r>
+              <a:rPr lang="de-DE" sz="2000" dirty="0" err="1"/>
+              <a:t>meißten</a:t>
+            </a:r>
+            <a:r>
+              <a:rPr lang="de-DE" sz="2000" dirty="0"/>
+              <a:t> anderen Fällen haben die Hersteller bzw. Geräte die Verantwortung, hier liegt die Verantwortung bei den Menschen, die die Funkgeräte betreiben. </a:t>
+            </a:r>
+            <a:endParaRPr lang="en-GB" sz="2000" dirty="0"/>
+          </a:p>
+        </p:txBody>
+      </p:sp>
+      <p:sp>
+        <p:nvSpPr>
+          <p:cNvPr id="4" name="Textfeld 3">
+            <a:extLst>
+              <a:ext uri="{FF2B5EF4-FFF2-40B4-BE49-F238E27FC236}">
+                <a16:creationId xmlns:a16="http://schemas.microsoft.com/office/drawing/2014/main" id="{268A3AE1-6F46-DA9B-983F-30D8676FCDA1}"/>
+              </a:ext>
+            </a:extLst>
+          </p:cNvPr>
+          <p:cNvSpPr txBox="1"/>
+          <p:nvPr/>
+        </p:nvSpPr>
+        <p:spPr>
+          <a:xfrm>
+            <a:off x="6096000" y="2059200"/>
+            <a:ext cx="6096000" cy="4708981"/>
+          </a:xfrm>
+          <a:prstGeom prst="rect">
+            <a:avLst/>
+          </a:prstGeom>
+          <a:noFill/>
+        </p:spPr>
+        <p:txBody>
+          <a:bodyPr wrap="square" rtlCol="0">
+            <a:spAutoFit/>
+          </a:bodyPr>
+          <a:lstStyle/>
+          <a:p>
+            <a:r>
+              <a:rPr lang="de-DE" sz="2000" b="1" noProof="0" dirty="0">
+                <a:solidFill>
+                  <a:srgbClr val="FF0000"/>
+                </a:solidFill>
+              </a:rPr>
+              <a:t>FALSCH sind:</a:t>
+            </a:r>
+          </a:p>
+          <a:p>
+            <a:r>
+              <a:rPr lang="de-DE" sz="2000" b="1" dirty="0">
+                <a:solidFill>
+                  <a:srgbClr val="FF0000"/>
+                </a:solidFill>
+              </a:rPr>
+              <a:t>X</a:t>
+            </a:r>
+            <a:r>
+              <a:rPr lang="de-DE" sz="2000" dirty="0"/>
+              <a:t> benötigt in keinem Fall eine Standortbescheinigung der BNetzA für seine Amateurfunkstelle. </a:t>
+            </a:r>
+            <a:r>
+              <a:rPr lang="de-DE" sz="2000" b="1" dirty="0">
+                <a:solidFill>
+                  <a:srgbClr val="FF0000"/>
+                </a:solidFill>
+              </a:rPr>
+              <a:t>X</a:t>
+            </a:r>
+          </a:p>
+          <a:p>
+            <a:r>
+              <a:rPr lang="de-DE" sz="2000" dirty="0"/>
+              <a:t>Über 10W EIRP (siehe Technik) brauchen auch wir z.B. eine Standortbescheinigung. </a:t>
+            </a:r>
+          </a:p>
+          <a:p>
+            <a:endParaRPr lang="de-DE" sz="2000" dirty="0"/>
+          </a:p>
+          <a:p>
+            <a:r>
+              <a:rPr lang="de-DE" sz="2000" b="1" dirty="0">
+                <a:solidFill>
+                  <a:srgbClr val="FF0000"/>
+                </a:solidFill>
+              </a:rPr>
+              <a:t>X</a:t>
+            </a:r>
+            <a:r>
+              <a:rPr lang="de-DE" sz="2000" dirty="0"/>
+              <a:t> muss die einschlägigen Bestimmungen der BNetzA zur elektrischen Sicherheit nicht beachten. </a:t>
+            </a:r>
+            <a:r>
+              <a:rPr lang="de-DE" sz="2000" b="1" dirty="0">
+                <a:solidFill>
+                  <a:srgbClr val="FF0000"/>
+                </a:solidFill>
+              </a:rPr>
+              <a:t>X </a:t>
+            </a:r>
+          </a:p>
+          <a:p>
+            <a:r>
+              <a:rPr lang="de-DE" sz="2000" dirty="0"/>
+              <a:t>Sicherheitsregeln gelten am Ende immer.</a:t>
+            </a:r>
+          </a:p>
+          <a:p>
+            <a:endParaRPr lang="de-DE" sz="2000" b="1" dirty="0">
+              <a:solidFill>
+                <a:srgbClr val="FF0000"/>
+              </a:solidFill>
+            </a:endParaRPr>
+          </a:p>
+          <a:p>
+            <a:r>
+              <a:rPr lang="de-DE" sz="2000" b="1" dirty="0">
+                <a:solidFill>
+                  <a:srgbClr val="FF0000"/>
+                </a:solidFill>
+              </a:rPr>
+              <a:t>X</a:t>
+            </a:r>
+            <a:r>
+              <a:rPr lang="de-DE" sz="2000" dirty="0"/>
+              <a:t>  darf mit seiner Amateurfunkstelle jederzeit Nachrichten für und an Dritte übermitteln, die nicht den Amateurfunkdienst betreffen. </a:t>
+            </a:r>
+            <a:r>
+              <a:rPr lang="de-DE" sz="2000" b="1" dirty="0">
+                <a:solidFill>
+                  <a:srgbClr val="FF0000"/>
+                </a:solidFill>
+              </a:rPr>
+              <a:t>X</a:t>
+            </a:r>
+          </a:p>
+          <a:p>
+            <a:r>
+              <a:rPr lang="de-DE" sz="2000" dirty="0"/>
+              <a:t>Widerspricht dem AFuG und den RR (VA 102). Keine Kommunikationsdienstleistungen!</a:t>
+            </a:r>
+          </a:p>
+        </p:txBody>
+      </p:sp>
+      <p:sp>
+        <p:nvSpPr>
+          <p:cNvPr id="5" name="Textfeld 4">
+            <a:extLst>
+              <a:ext uri="{FF2B5EF4-FFF2-40B4-BE49-F238E27FC236}">
+                <a16:creationId xmlns:a16="http://schemas.microsoft.com/office/drawing/2014/main" id="{0E552B5F-7485-312A-C924-68C33A5F2463}"/>
+              </a:ext>
+            </a:extLst>
+          </p:cNvPr>
+          <p:cNvSpPr txBox="1"/>
+          <p:nvPr/>
+        </p:nvSpPr>
+        <p:spPr>
+          <a:xfrm>
+            <a:off x="438912" y="4178808"/>
+            <a:ext cx="5047488" cy="646331"/>
+          </a:xfrm>
+          <a:prstGeom prst="rect">
+            <a:avLst/>
+          </a:prstGeom>
+          <a:noFill/>
+        </p:spPr>
+        <p:txBody>
+          <a:bodyPr wrap="square" rtlCol="0">
+            <a:spAutoFit/>
+          </a:bodyPr>
+          <a:lstStyle/>
+          <a:p>
+            <a:r>
+              <a:rPr lang="de-DE" dirty="0"/>
+              <a:t>Idee: simple Skizze eines stark </a:t>
+            </a:r>
+            <a:r>
+              <a:rPr lang="de-DE" dirty="0" err="1"/>
+              <a:t>verbastelten</a:t>
+            </a:r>
+            <a:r>
+              <a:rPr lang="de-DE" dirty="0"/>
+              <a:t> Funkgeräts, dennoch mit grünem Haken</a:t>
+            </a:r>
+            <a:endParaRPr lang="en-GB" dirty="0"/>
+          </a:p>
+        </p:txBody>
+      </p:sp>
+    </p:spTree>
+    <p:extLst>
+      <p:ext uri="{BB962C8B-B14F-4D97-AF65-F5344CB8AC3E}">
+        <p14:creationId xmlns:p14="http://schemas.microsoft.com/office/powerpoint/2010/main" val="1152672343"/>
       </p:ext>
     </p:extLst>
   </p:cSld>

</xml_diff>